<commit_message>
Dark Net/Concept of the DarkNet.pptx modifié
</commit_message>
<xml_diff>
--- a/BTS 1er année/Anglais/Dark Net/Concept of the DarkNet.pptx
+++ b/BTS 1er année/Anglais/Dark Net/Concept of the DarkNet.pptx
@@ -9,8 +9,9 @@
     <p:sldId id="257" r:id="rId3"/>
     <p:sldId id="258" r:id="rId4"/>
     <p:sldId id="259" r:id="rId5"/>
-    <p:sldId id="261" r:id="rId6"/>
-    <p:sldId id="260" r:id="rId7"/>
+    <p:sldId id="260" r:id="rId6"/>
+    <p:sldId id="261" r:id="rId7"/>
+    <p:sldId id="262" r:id="rId8"/>
   </p:sldIdLst>
   <p:sldSz cx="12192000" cy="6858000"/>
   <p:notesSz cx="6858000" cy="9144000"/>
@@ -110,6 +111,21 @@
     </a:lvl9pPr>
   </p:defaultTextStyle>
   <p:extLst>
+    <p:ext uri="{521415D9-36F7-43E2-AB2F-B90AF26B5E84}">
+      <p14:sectionLst xmlns:p14="http://schemas.microsoft.com/office/powerpoint/2010/main">
+        <p14:section name="Section par défaut" id="{BA4A3FE6-379F-4573-AC20-6B4E1939E5D4}">
+          <p14:sldIdLst>
+            <p14:sldId id="256"/>
+            <p14:sldId id="257"/>
+            <p14:sldId id="258"/>
+            <p14:sldId id="259"/>
+            <p14:sldId id="260"/>
+            <p14:sldId id="261"/>
+            <p14:sldId id="262"/>
+          </p14:sldIdLst>
+        </p14:section>
+      </p14:sectionLst>
+    </p:ext>
     <p:ext uri="{EFAFB233-063F-42B5-8137-9DF3F51BA10A}">
       <p15:sldGuideLst xmlns:p15="http://schemas.microsoft.com/office/powerpoint/2012/main"/>
     </p:ext>
@@ -619,7 +635,7 @@
           <a:p>
             <a:fld id="{C0671820-2DF0-4D46-B0CB-5EAB356F2817}" type="datetimeFigureOut">
               <a:rPr lang="fr-FR" smtClean="0"/>
-              <a:t>23/01/2019</a:t>
+              <a:t>28/01/2019</a:t>
             </a:fld>
             <a:endParaRPr lang="fr-FR"/>
           </a:p>
@@ -915,7 +931,7 @@
           <a:p>
             <a:fld id="{C0671820-2DF0-4D46-B0CB-5EAB356F2817}" type="datetimeFigureOut">
               <a:rPr lang="fr-FR" smtClean="0"/>
-              <a:t>23/01/2019</a:t>
+              <a:t>28/01/2019</a:t>
             </a:fld>
             <a:endParaRPr lang="fr-FR"/>
           </a:p>
@@ -1163,7 +1179,7 @@
           <a:p>
             <a:fld id="{C0671820-2DF0-4D46-B0CB-5EAB356F2817}" type="datetimeFigureOut">
               <a:rPr lang="fr-FR" smtClean="0"/>
-              <a:t>23/01/2019</a:t>
+              <a:t>28/01/2019</a:t>
             </a:fld>
             <a:endParaRPr lang="fr-FR"/>
           </a:p>
@@ -1703,7 +1719,7 @@
           <a:p>
             <a:fld id="{C0671820-2DF0-4D46-B0CB-5EAB356F2817}" type="datetimeFigureOut">
               <a:rPr lang="fr-FR" smtClean="0"/>
-              <a:t>23/01/2019</a:t>
+              <a:t>28/01/2019</a:t>
             </a:fld>
             <a:endParaRPr lang="fr-FR"/>
           </a:p>
@@ -1951,7 +1967,7 @@
           <a:p>
             <a:fld id="{C0671820-2DF0-4D46-B0CB-5EAB356F2817}" type="datetimeFigureOut">
               <a:rPr lang="fr-FR" smtClean="0"/>
-              <a:t>23/01/2019</a:t>
+              <a:t>28/01/2019</a:t>
             </a:fld>
             <a:endParaRPr lang="fr-FR"/>
           </a:p>
@@ -2483,7 +2499,7 @@
           <a:p>
             <a:fld id="{C0671820-2DF0-4D46-B0CB-5EAB356F2817}" type="datetimeFigureOut">
               <a:rPr lang="fr-FR" smtClean="0"/>
-              <a:t>23/01/2019</a:t>
+              <a:t>28/01/2019</a:t>
             </a:fld>
             <a:endParaRPr lang="fr-FR"/>
           </a:p>
@@ -2780,7 +2796,7 @@
           <a:p>
             <a:fld id="{C0671820-2DF0-4D46-B0CB-5EAB356F2817}" type="datetimeFigureOut">
               <a:rPr lang="fr-FR" smtClean="0"/>
-              <a:t>23/01/2019</a:t>
+              <a:t>28/01/2019</a:t>
             </a:fld>
             <a:endParaRPr lang="fr-FR"/>
           </a:p>
@@ -2954,7 +2970,7 @@
           <a:p>
             <a:fld id="{C0671820-2DF0-4D46-B0CB-5EAB356F2817}" type="datetimeFigureOut">
               <a:rPr lang="fr-FR" smtClean="0"/>
-              <a:t>23/01/2019</a:t>
+              <a:t>28/01/2019</a:t>
             </a:fld>
             <a:endParaRPr lang="fr-FR"/>
           </a:p>
@@ -3134,7 +3150,7 @@
           <a:p>
             <a:fld id="{C0671820-2DF0-4D46-B0CB-5EAB356F2817}" type="datetimeFigureOut">
               <a:rPr lang="fr-FR" smtClean="0"/>
-              <a:t>23/01/2019</a:t>
+              <a:t>28/01/2019</a:t>
             </a:fld>
             <a:endParaRPr lang="fr-FR"/>
           </a:p>
@@ -3304,7 +3320,7 @@
           <a:p>
             <a:fld id="{C0671820-2DF0-4D46-B0CB-5EAB356F2817}" type="datetimeFigureOut">
               <a:rPr lang="fr-FR" smtClean="0"/>
-              <a:t>23/01/2019</a:t>
+              <a:t>28/01/2019</a:t>
             </a:fld>
             <a:endParaRPr lang="fr-FR"/>
           </a:p>
@@ -3555,7 +3571,7 @@
           <a:p>
             <a:fld id="{C0671820-2DF0-4D46-B0CB-5EAB356F2817}" type="datetimeFigureOut">
               <a:rPr lang="fr-FR" smtClean="0"/>
-              <a:t>23/01/2019</a:t>
+              <a:t>28/01/2019</a:t>
             </a:fld>
             <a:endParaRPr lang="fr-FR"/>
           </a:p>
@@ -3852,7 +3868,7 @@
           <a:p>
             <a:fld id="{C0671820-2DF0-4D46-B0CB-5EAB356F2817}" type="datetimeFigureOut">
               <a:rPr lang="fr-FR" smtClean="0"/>
-              <a:t>23/01/2019</a:t>
+              <a:t>28/01/2019</a:t>
             </a:fld>
             <a:endParaRPr lang="fr-FR"/>
           </a:p>
@@ -4294,7 +4310,7 @@
           <a:p>
             <a:fld id="{C0671820-2DF0-4D46-B0CB-5EAB356F2817}" type="datetimeFigureOut">
               <a:rPr lang="fr-FR" smtClean="0"/>
-              <a:t>23/01/2019</a:t>
+              <a:t>28/01/2019</a:t>
             </a:fld>
             <a:endParaRPr lang="fr-FR"/>
           </a:p>
@@ -4412,7 +4428,7 @@
           <a:p>
             <a:fld id="{C0671820-2DF0-4D46-B0CB-5EAB356F2817}" type="datetimeFigureOut">
               <a:rPr lang="fr-FR" smtClean="0"/>
-              <a:t>23/01/2019</a:t>
+              <a:t>28/01/2019</a:t>
             </a:fld>
             <a:endParaRPr lang="fr-FR"/>
           </a:p>
@@ -4507,7 +4523,7 @@
           <a:p>
             <a:fld id="{C0671820-2DF0-4D46-B0CB-5EAB356F2817}" type="datetimeFigureOut">
               <a:rPr lang="fr-FR" smtClean="0"/>
-              <a:t>23/01/2019</a:t>
+              <a:t>28/01/2019</a:t>
             </a:fld>
             <a:endParaRPr lang="fr-FR"/>
           </a:p>
@@ -4790,7 +4806,7 @@
           <a:p>
             <a:fld id="{C0671820-2DF0-4D46-B0CB-5EAB356F2817}" type="datetimeFigureOut">
               <a:rPr lang="fr-FR" smtClean="0"/>
-              <a:t>23/01/2019</a:t>
+              <a:t>28/01/2019</a:t>
             </a:fld>
             <a:endParaRPr lang="fr-FR"/>
           </a:p>
@@ -5081,7 +5097,7 @@
           <a:p>
             <a:fld id="{C0671820-2DF0-4D46-B0CB-5EAB356F2817}" type="datetimeFigureOut">
               <a:rPr lang="fr-FR" smtClean="0"/>
-              <a:t>23/01/2019</a:t>
+              <a:t>28/01/2019</a:t>
             </a:fld>
             <a:endParaRPr lang="fr-FR"/>
           </a:p>
@@ -5611,7 +5627,7 @@
           <a:p>
             <a:fld id="{C0671820-2DF0-4D46-B0CB-5EAB356F2817}" type="datetimeFigureOut">
               <a:rPr lang="fr-FR" smtClean="0"/>
-              <a:t>23/01/2019</a:t>
+              <a:t>28/01/2019</a:t>
             </a:fld>
             <a:endParaRPr lang="fr-FR"/>
           </a:p>
@@ -6347,100 +6363,58 @@
           <a:lstStyle/>
           <a:p>
             <a:r>
-              <a:rPr lang="fr-FR" sz="3200" b="1" dirty="0" err="1">
-                <a:solidFill>
-                  <a:schemeClr val="accent6">
-                    <a:lumMod val="50000"/>
-                  </a:schemeClr>
-                </a:solidFill>
-              </a:rPr>
+              <a:rPr lang="fr-FR" sz="3200" b="1" dirty="0" err="1"/>
               <a:t>Presentation</a:t>
             </a:r>
-            <a:endParaRPr lang="fr-FR" sz="3200" b="1" dirty="0">
-              <a:solidFill>
-                <a:schemeClr val="accent6">
-                  <a:lumMod val="50000"/>
-                </a:schemeClr>
-              </a:solidFill>
-            </a:endParaRPr>
-          </a:p>
-          <a:p>
-            <a:r>
-              <a:rPr lang="fr-FR" sz="3200" b="1" dirty="0" err="1">
-                <a:solidFill>
-                  <a:schemeClr val="accent6">
-                    <a:lumMod val="50000"/>
-                  </a:schemeClr>
-                </a:solidFill>
-              </a:rPr>
+            <a:endParaRPr lang="fr-FR" sz="3200" b="1" dirty="0"/>
+          </a:p>
+          <a:p>
+            <a:r>
+              <a:rPr lang="fr-FR" sz="3200" b="1" dirty="0" err="1"/>
               <a:t>Useful</a:t>
             </a:r>
             <a:r>
-              <a:rPr lang="fr-FR" sz="3200" b="1" dirty="0">
-                <a:solidFill>
-                  <a:schemeClr val="accent6">
-                    <a:lumMod val="50000"/>
-                  </a:schemeClr>
-                </a:solidFill>
-              </a:rPr>
+              <a:rPr lang="fr-FR" sz="3200" b="1" dirty="0"/>
               <a:t> </a:t>
             </a:r>
             <a:r>
-              <a:rPr lang="fr-FR" sz="3200" b="1" dirty="0" err="1">
-                <a:solidFill>
-                  <a:schemeClr val="accent6">
-                    <a:lumMod val="50000"/>
-                  </a:schemeClr>
-                </a:solidFill>
-              </a:rPr>
+              <a:rPr lang="fr-FR" sz="3200" b="1" dirty="0" err="1"/>
               <a:t>examples</a:t>
             </a:r>
             <a:r>
-              <a:rPr lang="fr-FR" sz="3200" b="1" dirty="0">
-                <a:solidFill>
-                  <a:schemeClr val="accent6">
-                    <a:lumMod val="50000"/>
-                  </a:schemeClr>
-                </a:solidFill>
-              </a:rPr>
+              <a:rPr lang="fr-FR" sz="3200" b="1" dirty="0"/>
               <a:t> : </a:t>
             </a:r>
             <a:r>
-              <a:rPr lang="fr-FR" sz="3200" b="1" dirty="0" err="1">
-                <a:solidFill>
-                  <a:schemeClr val="accent6">
-                    <a:lumMod val="50000"/>
-                  </a:schemeClr>
-                </a:solidFill>
-              </a:rPr>
+              <a:rPr lang="fr-FR" sz="3200" b="1" dirty="0" err="1"/>
               <a:t>advantages</a:t>
             </a:r>
-            <a:endParaRPr lang="fr-FR" sz="3200" b="1" dirty="0">
-              <a:solidFill>
-                <a:schemeClr val="accent6">
-                  <a:lumMod val="50000"/>
-                </a:schemeClr>
-              </a:solidFill>
-            </a:endParaRPr>
-          </a:p>
-          <a:p>
-            <a:r>
-              <a:rPr lang="fr-FR" sz="3200" b="1" dirty="0" err="1">
-                <a:solidFill>
-                  <a:schemeClr val="accent6">
-                    <a:lumMod val="50000"/>
-                  </a:schemeClr>
-                </a:solidFill>
-              </a:rPr>
+            <a:endParaRPr lang="fr-FR" sz="3200" b="1" dirty="0"/>
+          </a:p>
+          <a:p>
+            <a:r>
+              <a:rPr lang="fr-FR" sz="3200" b="1" dirty="0" err="1"/>
               <a:t>Disadvantages</a:t>
             </a:r>
-            <a:endParaRPr lang="fr-FR" sz="3200" b="1" dirty="0">
-              <a:solidFill>
-                <a:schemeClr val="accent6">
-                  <a:lumMod val="50000"/>
-                </a:schemeClr>
-              </a:solidFill>
-            </a:endParaRPr>
+            <a:endParaRPr lang="fr-FR" sz="3200" b="1" dirty="0"/>
+          </a:p>
+          <a:p>
+            <a:r>
+              <a:rPr lang="fr-FR" sz="3200" b="1" dirty="0" err="1"/>
+              <a:t>My</a:t>
+            </a:r>
+            <a:r>
+              <a:rPr lang="fr-FR" sz="3200" b="1" dirty="0"/>
+              <a:t> </a:t>
+            </a:r>
+            <a:r>
+              <a:rPr lang="fr-FR" sz="3200" b="1" dirty="0" err="1"/>
+              <a:t>experience</a:t>
+            </a:r>
+            <a:r>
+              <a:rPr lang="fr-FR" sz="3200" b="1" dirty="0"/>
+              <a:t> and opinion</a:t>
+            </a:r>
           </a:p>
         </p:txBody>
       </p:sp>
@@ -6546,7 +6520,7 @@
         </p:blipFill>
         <p:spPr bwMode="auto">
           <a:xfrm>
-            <a:off x="4922217" y="1191616"/>
+            <a:off x="5093133" y="1191616"/>
             <a:ext cx="6713330" cy="5073046"/>
           </a:xfrm>
           <a:prstGeom prst="rect">
@@ -6578,7 +6552,7 @@
         </p:nvSpPr>
         <p:spPr>
           <a:xfrm>
-            <a:off x="1510748" y="1298713"/>
+            <a:off x="1569941" y="1310596"/>
             <a:ext cx="3180522" cy="2585323"/>
           </a:xfrm>
           <a:prstGeom prst="rect">
@@ -6594,19 +6568,7 @@
           <a:p>
             <a:r>
               <a:rPr lang="en-US" dirty="0"/>
-              <a:t>Portions of internet not open to public view </a:t>
-            </a:r>
-            <a:r>
-              <a:rPr lang="fr-FR" dirty="0"/>
-              <a:t>or </a:t>
-            </a:r>
-            <a:r>
-              <a:rPr lang="fr-FR" dirty="0" err="1"/>
-              <a:t>hidden</a:t>
-            </a:r>
-            <a:r>
-              <a:rPr lang="fr-FR" dirty="0"/>
-              <a:t> networks</a:t>
+              <a:t>Layer of internet not open to public views</a:t>
             </a:r>
             <a:br>
               <a:rPr lang="fr-FR" dirty="0"/>
@@ -6685,8 +6647,8 @@
         </p:nvSpPr>
         <p:spPr>
           <a:xfrm>
-            <a:off x="6361044" y="3923808"/>
-            <a:ext cx="5327374" cy="2585323"/>
+            <a:off x="6834333" y="4224009"/>
+            <a:ext cx="5246572" cy="2585323"/>
           </a:xfrm>
           <a:prstGeom prst="rect">
             <a:avLst/>
@@ -6700,19 +6662,24 @@
           <a:lstStyle/>
           <a:p>
             <a:r>
+              <a:rPr lang="fr-FR" b="1" dirty="0" err="1"/>
+              <a:t>Needs</a:t>
+            </a:r>
+            <a:r>
+              <a:rPr lang="fr-FR" b="1" dirty="0"/>
+              <a:t> </a:t>
+            </a:r>
+          </a:p>
+          <a:p>
+            <a:r>
+              <a:rPr lang="fr-FR" dirty="0"/>
+              <a:t>	Computer / mobile phone = internet </a:t>
+            </a:r>
+            <a:r>
               <a:rPr lang="fr-FR" dirty="0" err="1"/>
-              <a:t>Needs</a:t>
-            </a:r>
-            <a:r>
-              <a:rPr lang="fr-FR" dirty="0"/>
-              <a:t> </a:t>
-            </a:r>
-          </a:p>
-          <a:p>
-            <a:r>
-              <a:rPr lang="fr-FR" dirty="0"/>
-              <a:t>	Computer</a:t>
-            </a:r>
+              <a:t>connection</a:t>
+            </a:r>
+            <a:endParaRPr lang="fr-FR" dirty="0"/>
           </a:p>
           <a:p>
             <a:r>
@@ -6841,8 +6808,8 @@
         </p:blipFill>
         <p:spPr bwMode="auto">
           <a:xfrm>
-            <a:off x="303450" y="87358"/>
-            <a:ext cx="6343019" cy="3406806"/>
+            <a:off x="1828895" y="833815"/>
+            <a:ext cx="4516378" cy="2425726"/>
           </a:xfrm>
           <a:prstGeom prst="rect">
             <a:avLst/>
@@ -6888,7 +6855,7 @@
         </p:blipFill>
         <p:spPr bwMode="auto">
           <a:xfrm rot="20760620">
-            <a:off x="8321332" y="1572399"/>
+            <a:off x="8321332" y="1612155"/>
             <a:ext cx="2040812" cy="2040812"/>
           </a:xfrm>
           <a:prstGeom prst="rect">
@@ -6935,7 +6902,7 @@
         </p:blipFill>
         <p:spPr bwMode="auto">
           <a:xfrm>
-            <a:off x="10315286" y="88424"/>
+            <a:off x="10315286" y="48668"/>
             <a:ext cx="1690681" cy="2758851"/>
           </a:xfrm>
           <a:prstGeom prst="rect">
@@ -6982,7 +6949,7 @@
         </p:blipFill>
         <p:spPr bwMode="auto">
           <a:xfrm>
-            <a:off x="6995058" y="87358"/>
+            <a:off x="6995058" y="47602"/>
             <a:ext cx="1861780" cy="1861778"/>
           </a:xfrm>
           <a:prstGeom prst="rect">
@@ -7029,8 +6996,8 @@
         </p:blipFill>
         <p:spPr bwMode="auto">
           <a:xfrm>
-            <a:off x="1219750" y="3675416"/>
-            <a:ext cx="5048529" cy="3029117"/>
+            <a:off x="2164359" y="3681375"/>
+            <a:ext cx="4180914" cy="2508548"/>
           </a:xfrm>
           <a:prstGeom prst="rect">
             <a:avLst/>
@@ -7082,7 +7049,7 @@
           <p:cNvPr id="2" name="Titre 1">
             <a:extLst>
               <a:ext uri="{FF2B5EF4-FFF2-40B4-BE49-F238E27FC236}">
-                <a16:creationId xmlns:a16="http://schemas.microsoft.com/office/drawing/2014/main" id="{0654B1DD-62C5-42E3-82DB-B33966CCB5F0}"/>
+                <a16:creationId xmlns:a16="http://schemas.microsoft.com/office/drawing/2014/main" id="{20ECB5E3-84C7-491F-8DD5-F28381D2AB8A}"/>
               </a:ext>
             </a:extLst>
           </p:cNvPr>
@@ -7095,7 +7062,7 @@
         </p:nvSpPr>
         <p:spPr>
           <a:xfrm>
-            <a:off x="-1219133" y="-347870"/>
+            <a:off x="-715549" y="-387627"/>
             <a:ext cx="10018713" cy="1752599"/>
           </a:xfrm>
         </p:spPr>
@@ -7111,9 +7078,9 @@
                   <a:schemeClr val="bg1"/>
                 </a:solidFill>
               </a:rPr>
-              <a:t>Advantages</a:t>
-            </a:r>
-            <a:endParaRPr lang="fr-FR" sz="6000" b="1" dirty="0">
+              <a:t>Disadvantages</a:t>
+            </a:r>
+            <a:endParaRPr lang="fr-FR" sz="3200" b="1" dirty="0">
               <a:solidFill>
                 <a:schemeClr val="bg1"/>
               </a:solidFill>
@@ -7126,7 +7093,7 @@
           <p:cNvPr id="3" name="Espace réservé du contenu 2">
             <a:extLst>
               <a:ext uri="{FF2B5EF4-FFF2-40B4-BE49-F238E27FC236}">
-                <a16:creationId xmlns:a16="http://schemas.microsoft.com/office/drawing/2014/main" id="{72F5262C-41AB-4089-ABFA-50D8CB9829DD}"/>
+                <a16:creationId xmlns:a16="http://schemas.microsoft.com/office/drawing/2014/main" id="{4C7AA62C-5B5F-4BD6-95E6-22430EC7663C}"/>
               </a:ext>
             </a:extLst>
           </p:cNvPr>
@@ -7137,19 +7104,243 @@
             <p:ph idx="1"/>
           </p:nvPr>
         </p:nvSpPr>
-        <p:spPr/>
-        <p:txBody>
-          <a:bodyPr/>
+        <p:spPr>
+          <a:xfrm>
+            <a:off x="7281644" y="3691157"/>
+            <a:ext cx="4705204" cy="2526034"/>
+          </a:xfrm>
+        </p:spPr>
+        <p:txBody>
+          <a:bodyPr>
+            <a:normAutofit fontScale="62500" lnSpcReduction="20000"/>
+          </a:bodyPr>
           <a:lstStyle/>
           <a:p>
-            <a:endParaRPr lang="fr-FR"/>
-          </a:p>
-        </p:txBody>
-      </p:sp>
+            <a:r>
+              <a:rPr lang="fr-FR" b="1" dirty="0" err="1"/>
+              <a:t>Contraband</a:t>
+            </a:r>
+            <a:endParaRPr lang="fr-FR" b="1" dirty="0"/>
+          </a:p>
+          <a:p>
+            <a:r>
+              <a:rPr lang="fr-FR" b="1" dirty="0" err="1"/>
+              <a:t>Illegal</a:t>
+            </a:r>
+            <a:r>
+              <a:rPr lang="fr-FR" b="1" dirty="0"/>
+              <a:t> services</a:t>
+            </a:r>
+          </a:p>
+          <a:p>
+            <a:r>
+              <a:rPr lang="en-US" b="1" dirty="0"/>
+              <a:t>Storing money in online wallets </a:t>
+            </a:r>
+            <a:endParaRPr lang="fr-FR" b="1" dirty="0"/>
+          </a:p>
+          <a:p>
+            <a:r>
+              <a:rPr lang="fr-FR" b="1" dirty="0"/>
+              <a:t>Risk : </a:t>
+            </a:r>
+            <a:r>
+              <a:rPr lang="fr-FR" b="1" dirty="0" err="1"/>
+              <a:t>caught</a:t>
+            </a:r>
+            <a:r>
+              <a:rPr lang="fr-FR" b="1" dirty="0"/>
+              <a:t> </a:t>
+            </a:r>
+            <a:r>
+              <a:rPr lang="fr-FR" b="1" dirty="0" err="1"/>
+              <a:t>with</a:t>
+            </a:r>
+            <a:r>
+              <a:rPr lang="fr-FR" b="1" dirty="0"/>
+              <a:t> </a:t>
+            </a:r>
+            <a:r>
+              <a:rPr lang="fr-FR" b="1" dirty="0" err="1"/>
+              <a:t>smuggle</a:t>
+            </a:r>
+            <a:r>
+              <a:rPr lang="fr-FR" b="1" dirty="0"/>
+              <a:t>, </a:t>
+            </a:r>
+            <a:r>
+              <a:rPr lang="fr-FR" b="1" dirty="0" err="1"/>
+              <a:t>get</a:t>
+            </a:r>
+            <a:r>
+              <a:rPr lang="fr-FR" b="1" dirty="0"/>
+              <a:t> </a:t>
+            </a:r>
+            <a:r>
+              <a:rPr lang="fr-FR" b="1" dirty="0" err="1"/>
+              <a:t>prosecution</a:t>
+            </a:r>
+            <a:endParaRPr lang="fr-FR" b="1" dirty="0"/>
+          </a:p>
+          <a:p>
+            <a:r>
+              <a:rPr lang="fr-FR" b="1" dirty="0"/>
+              <a:t> </a:t>
+            </a:r>
+            <a:r>
+              <a:rPr lang="en-US" b="1" dirty="0"/>
+              <a:t>Customers can never be sure that the stuff they order is the stuff they will get</a:t>
+            </a:r>
+            <a:endParaRPr lang="fr-FR" b="1" dirty="0"/>
+          </a:p>
+          <a:p>
+            <a:r>
+              <a:rPr lang="fr-FR" b="1" dirty="0" err="1"/>
+              <a:t>Shipment</a:t>
+            </a:r>
+            <a:r>
+              <a:rPr lang="fr-FR" b="1" dirty="0"/>
+              <a:t> </a:t>
+            </a:r>
+            <a:r>
+              <a:rPr lang="fr-FR" b="1" dirty="0" err="1"/>
+              <a:t>seizing</a:t>
+            </a:r>
+            <a:endParaRPr lang="fr-FR" b="1" dirty="0"/>
+          </a:p>
+          <a:p>
+            <a:r>
+              <a:rPr lang="en-US" b="1" dirty="0"/>
+              <a:t>you can never check the quality of the product</a:t>
+            </a:r>
+            <a:endParaRPr lang="fr-FR" b="1" dirty="0"/>
+          </a:p>
+        </p:txBody>
+      </p:sp>
+      <p:pic>
+        <p:nvPicPr>
+          <p:cNvPr id="4" name="Image 3">
+            <a:extLst>
+              <a:ext uri="{FF2B5EF4-FFF2-40B4-BE49-F238E27FC236}">
+                <a16:creationId xmlns:a16="http://schemas.microsoft.com/office/drawing/2014/main" id="{EA5CB2B9-ECE9-41A9-A8EA-5C5B10E5107F}"/>
+              </a:ext>
+            </a:extLst>
+          </p:cNvPr>
+          <p:cNvPicPr>
+            <a:picLocks noChangeAspect="1"/>
+          </p:cNvPicPr>
+          <p:nvPr/>
+        </p:nvPicPr>
+        <p:blipFill>
+          <a:blip r:embed="rId2"/>
+          <a:stretch>
+            <a:fillRect/>
+          </a:stretch>
+        </p:blipFill>
+        <p:spPr>
+          <a:xfrm>
+            <a:off x="6412028" y="1698717"/>
+            <a:ext cx="5439487" cy="1107152"/>
+          </a:xfrm>
+          <a:prstGeom prst="rect">
+            <a:avLst/>
+          </a:prstGeom>
+        </p:spPr>
+      </p:pic>
+      <p:pic>
+        <p:nvPicPr>
+          <p:cNvPr id="5" name="Image 4">
+            <a:extLst>
+              <a:ext uri="{FF2B5EF4-FFF2-40B4-BE49-F238E27FC236}">
+                <a16:creationId xmlns:a16="http://schemas.microsoft.com/office/drawing/2014/main" id="{96FC5BA0-68EE-4369-9E49-A133BB06BC92}"/>
+              </a:ext>
+            </a:extLst>
+          </p:cNvPr>
+          <p:cNvPicPr>
+            <a:picLocks noChangeAspect="1"/>
+          </p:cNvPicPr>
+          <p:nvPr/>
+        </p:nvPicPr>
+        <p:blipFill>
+          <a:blip r:embed="rId3"/>
+          <a:stretch>
+            <a:fillRect/>
+          </a:stretch>
+        </p:blipFill>
+        <p:spPr>
+          <a:xfrm>
+            <a:off x="7908529" y="45426"/>
+            <a:ext cx="3086100" cy="1390650"/>
+          </a:xfrm>
+          <a:prstGeom prst="rect">
+            <a:avLst/>
+          </a:prstGeom>
+        </p:spPr>
+      </p:pic>
+      <p:pic>
+        <p:nvPicPr>
+          <p:cNvPr id="6" name="Image 5">
+            <a:extLst>
+              <a:ext uri="{FF2B5EF4-FFF2-40B4-BE49-F238E27FC236}">
+                <a16:creationId xmlns:a16="http://schemas.microsoft.com/office/drawing/2014/main" id="{E7743DAF-D39A-4BEB-981D-6EB2E557113B}"/>
+              </a:ext>
+            </a:extLst>
+          </p:cNvPr>
+          <p:cNvPicPr>
+            <a:picLocks noChangeAspect="1"/>
+          </p:cNvPicPr>
+          <p:nvPr/>
+        </p:nvPicPr>
+        <p:blipFill>
+          <a:blip r:embed="rId4"/>
+          <a:stretch>
+            <a:fillRect/>
+          </a:stretch>
+        </p:blipFill>
+        <p:spPr>
+          <a:xfrm>
+            <a:off x="2137331" y="1119143"/>
+            <a:ext cx="3086099" cy="3373452"/>
+          </a:xfrm>
+          <a:prstGeom prst="rect">
+            <a:avLst/>
+          </a:prstGeom>
+        </p:spPr>
+      </p:pic>
+      <p:pic>
+        <p:nvPicPr>
+          <p:cNvPr id="7" name="Image 6">
+            <a:extLst>
+              <a:ext uri="{FF2B5EF4-FFF2-40B4-BE49-F238E27FC236}">
+                <a16:creationId xmlns:a16="http://schemas.microsoft.com/office/drawing/2014/main" id="{C939B106-586F-4762-AE96-264C2F7D5E43}"/>
+              </a:ext>
+            </a:extLst>
+          </p:cNvPr>
+          <p:cNvPicPr>
+            <a:picLocks noChangeAspect="1"/>
+          </p:cNvPicPr>
+          <p:nvPr/>
+        </p:nvPicPr>
+        <p:blipFill>
+          <a:blip r:embed="rId5"/>
+          <a:stretch>
+            <a:fillRect/>
+          </a:stretch>
+        </p:blipFill>
+        <p:spPr>
+          <a:xfrm>
+            <a:off x="3832682" y="2948076"/>
+            <a:ext cx="2579346" cy="3718386"/>
+          </a:xfrm>
+          <a:prstGeom prst="rect">
+            <a:avLst/>
+          </a:prstGeom>
+        </p:spPr>
+      </p:pic>
     </p:spTree>
     <p:extLst>
       <p:ext uri="{BB962C8B-B14F-4D97-AF65-F5344CB8AC3E}">
-        <p14:creationId xmlns:p14="http://schemas.microsoft.com/office/powerpoint/2010/main" val="162992510"/>
+        <p14:creationId xmlns:p14="http://schemas.microsoft.com/office/powerpoint/2010/main" val="524656488"/>
       </p:ext>
     </p:extLst>
   </p:cSld>
@@ -7181,7 +7372,7 @@
           <p:cNvPr id="2" name="Titre 1">
             <a:extLst>
               <a:ext uri="{FF2B5EF4-FFF2-40B4-BE49-F238E27FC236}">
-                <a16:creationId xmlns:a16="http://schemas.microsoft.com/office/drawing/2014/main" id="{20ECB5E3-84C7-491F-8DD5-F28381D2AB8A}"/>
+                <a16:creationId xmlns:a16="http://schemas.microsoft.com/office/drawing/2014/main" id="{0654B1DD-62C5-42E3-82DB-B33966CCB5F0}"/>
               </a:ext>
             </a:extLst>
           </p:cNvPr>
@@ -7194,7 +7385,7 @@
         </p:nvSpPr>
         <p:spPr>
           <a:xfrm>
-            <a:off x="-715549" y="-387627"/>
+            <a:off x="-1321683" y="-403780"/>
             <a:ext cx="10018713" cy="1752599"/>
           </a:xfrm>
         </p:spPr>
@@ -7210,9 +7401,9 @@
                   <a:schemeClr val="bg1"/>
                 </a:solidFill>
               </a:rPr>
-              <a:t>Disadvantages</a:t>
-            </a:r>
-            <a:endParaRPr lang="fr-FR" sz="3200" b="1" dirty="0">
+              <a:t>Advantages</a:t>
+            </a:r>
+            <a:endParaRPr lang="fr-FR" sz="6000" b="1" dirty="0">
               <a:solidFill>
                 <a:schemeClr val="bg1"/>
               </a:solidFill>
@@ -7225,7 +7416,7 @@
           <p:cNvPr id="3" name="Espace réservé du contenu 2">
             <a:extLst>
               <a:ext uri="{FF2B5EF4-FFF2-40B4-BE49-F238E27FC236}">
-                <a16:creationId xmlns:a16="http://schemas.microsoft.com/office/drawing/2014/main" id="{4C7AA62C-5B5F-4BD6-95E6-22430EC7663C}"/>
+                <a16:creationId xmlns:a16="http://schemas.microsoft.com/office/drawing/2014/main" id="{72F5262C-41AB-4089-ABFA-50D8CB9829DD}"/>
               </a:ext>
             </a:extLst>
           </p:cNvPr>
@@ -7236,88 +7427,375 @@
             <p:ph idx="1"/>
           </p:nvPr>
         </p:nvSpPr>
-        <p:spPr/>
-        <p:txBody>
-          <a:bodyPr/>
+        <p:spPr>
+          <a:xfrm>
+            <a:off x="3127049" y="4394453"/>
+            <a:ext cx="2410627" cy="2296682"/>
+          </a:xfrm>
+        </p:spPr>
+        <p:txBody>
+          <a:bodyPr>
+            <a:normAutofit fontScale="55000" lnSpcReduction="20000"/>
+          </a:bodyPr>
           <a:lstStyle/>
           <a:p>
             <a:r>
-              <a:rPr lang="fr-FR" dirty="0" err="1"/>
-              <a:t>Contraband</a:t>
+              <a:rPr lang="fr-FR" b="1" dirty="0" err="1"/>
+              <a:t>Anonymity</a:t>
+            </a:r>
+            <a:endParaRPr lang="fr-FR" b="1" dirty="0"/>
+          </a:p>
+          <a:p>
+            <a:r>
+              <a:rPr lang="fr-FR" b="1" dirty="0"/>
+              <a:t>No </a:t>
+            </a:r>
+            <a:r>
+              <a:rPr lang="fr-FR" b="1" dirty="0" err="1"/>
+              <a:t>physical</a:t>
+            </a:r>
+            <a:r>
+              <a:rPr lang="fr-FR" b="1" dirty="0"/>
+              <a:t> contact</a:t>
+            </a:r>
+          </a:p>
+          <a:p>
+            <a:r>
+              <a:rPr lang="en-US" b="1" dirty="0"/>
+              <a:t>You can buy many products that are not available in your country</a:t>
+            </a:r>
+          </a:p>
+          <a:p>
+            <a:r>
+              <a:rPr lang="fr-FR" b="1" dirty="0" err="1"/>
+              <a:t>Convenience</a:t>
+            </a:r>
+            <a:r>
+              <a:rPr lang="fr-FR" b="1" dirty="0"/>
+              <a:t> for shipping</a:t>
+            </a:r>
+          </a:p>
+          <a:p>
+            <a:r>
+              <a:rPr lang="fr-FR" b="1" dirty="0"/>
+              <a:t>Hardware </a:t>
+            </a:r>
+            <a:r>
+              <a:rPr lang="fr-FR" b="1" dirty="0" err="1"/>
+              <a:t>wallet</a:t>
+            </a:r>
+            <a:r>
+              <a:rPr lang="fr-FR" b="1" dirty="0"/>
+              <a:t> </a:t>
+            </a:r>
+            <a:r>
+              <a:rPr lang="fr-FR" b="1" dirty="0" err="1"/>
+              <a:t>created</a:t>
             </a:r>
             <a:endParaRPr lang="fr-FR" dirty="0"/>
           </a:p>
-          <a:p>
-            <a:r>
-              <a:rPr lang="fr-FR" dirty="0" err="1"/>
-              <a:t>Illegal</a:t>
-            </a:r>
-            <a:r>
-              <a:rPr lang="fr-FR" dirty="0"/>
-              <a:t> services</a:t>
-            </a:r>
-          </a:p>
-          <a:p>
-            <a:endParaRPr lang="fr-FR" dirty="0"/>
-          </a:p>
-          <a:p>
-            <a:r>
-              <a:rPr lang="fr-FR" dirty="0"/>
-              <a:t>Risk : </a:t>
-            </a:r>
-            <a:r>
-              <a:rPr lang="fr-FR" dirty="0" err="1"/>
-              <a:t>caught</a:t>
-            </a:r>
-            <a:r>
-              <a:rPr lang="fr-FR" dirty="0"/>
-              <a:t> </a:t>
-            </a:r>
-            <a:r>
-              <a:rPr lang="fr-FR" dirty="0" err="1"/>
-              <a:t>with</a:t>
-            </a:r>
-            <a:r>
-              <a:rPr lang="fr-FR" dirty="0"/>
-              <a:t> </a:t>
-            </a:r>
-            <a:r>
-              <a:rPr lang="fr-FR" dirty="0" err="1"/>
-              <a:t>smuggle</a:t>
-            </a:r>
-            <a:r>
-              <a:rPr lang="fr-FR" dirty="0"/>
-              <a:t>, </a:t>
-            </a:r>
-            <a:r>
-              <a:rPr lang="fr-FR" dirty="0" err="1"/>
-              <a:t>get</a:t>
-            </a:r>
-            <a:r>
-              <a:rPr lang="fr-FR" dirty="0"/>
-              <a:t> </a:t>
-            </a:r>
-            <a:r>
-              <a:rPr lang="fr-FR" dirty="0" err="1"/>
-              <a:t>prosecution</a:t>
-            </a:r>
-            <a:endParaRPr lang="fr-FR" dirty="0"/>
-          </a:p>
-          <a:p>
-            <a:r>
-              <a:rPr lang="fr-FR" dirty="0"/>
-              <a:t> </a:t>
-            </a:r>
-          </a:p>
-          <a:p>
-            <a:endParaRPr lang="fr-FR" dirty="0"/>
-          </a:p>
-        </p:txBody>
-      </p:sp>
+        </p:txBody>
+      </p:sp>
+      <p:pic>
+        <p:nvPicPr>
+          <p:cNvPr id="4" name="Image 3">
+            <a:extLst>
+              <a:ext uri="{FF2B5EF4-FFF2-40B4-BE49-F238E27FC236}">
+                <a16:creationId xmlns:a16="http://schemas.microsoft.com/office/drawing/2014/main" id="{9C2D3139-0270-4145-85BF-D02DD2E56A4E}"/>
+              </a:ext>
+            </a:extLst>
+          </p:cNvPr>
+          <p:cNvPicPr>
+            <a:picLocks noChangeAspect="1"/>
+          </p:cNvPicPr>
+          <p:nvPr/>
+        </p:nvPicPr>
+        <p:blipFill>
+          <a:blip r:embed="rId2"/>
+          <a:stretch>
+            <a:fillRect/>
+          </a:stretch>
+        </p:blipFill>
+        <p:spPr>
+          <a:xfrm>
+            <a:off x="6958222" y="3458924"/>
+            <a:ext cx="4305384" cy="2961860"/>
+          </a:xfrm>
+          <a:prstGeom prst="rect">
+            <a:avLst/>
+          </a:prstGeom>
+        </p:spPr>
+      </p:pic>
+      <p:pic>
+        <p:nvPicPr>
+          <p:cNvPr id="5" name="Image 4">
+            <a:extLst>
+              <a:ext uri="{FF2B5EF4-FFF2-40B4-BE49-F238E27FC236}">
+                <a16:creationId xmlns:a16="http://schemas.microsoft.com/office/drawing/2014/main" id="{34E0BD40-58A3-49CD-BC58-5C49ABAD322E}"/>
+              </a:ext>
+            </a:extLst>
+          </p:cNvPr>
+          <p:cNvPicPr>
+            <a:picLocks noChangeAspect="1"/>
+          </p:cNvPicPr>
+          <p:nvPr/>
+        </p:nvPicPr>
+        <p:blipFill rotWithShape="1">
+          <a:blip r:embed="rId3"/>
+          <a:srcRect t="8784" r="8100" b="310"/>
+          <a:stretch/>
+        </p:blipFill>
+        <p:spPr>
+          <a:xfrm>
+            <a:off x="5990602" y="362143"/>
+            <a:ext cx="6033580" cy="2618387"/>
+          </a:xfrm>
+          <a:prstGeom prst="rect">
+            <a:avLst/>
+          </a:prstGeom>
+        </p:spPr>
+      </p:pic>
+      <p:pic>
+        <p:nvPicPr>
+          <p:cNvPr id="6" name="Image 5">
+            <a:extLst>
+              <a:ext uri="{FF2B5EF4-FFF2-40B4-BE49-F238E27FC236}">
+                <a16:creationId xmlns:a16="http://schemas.microsoft.com/office/drawing/2014/main" id="{8D94EBEE-A86A-4BF7-875C-8068B7B19ED5}"/>
+              </a:ext>
+            </a:extLst>
+          </p:cNvPr>
+          <p:cNvPicPr>
+            <a:picLocks noChangeAspect="1"/>
+          </p:cNvPicPr>
+          <p:nvPr/>
+        </p:nvPicPr>
+        <p:blipFill>
+          <a:blip r:embed="rId4"/>
+          <a:stretch>
+            <a:fillRect/>
+          </a:stretch>
+        </p:blipFill>
+        <p:spPr>
+          <a:xfrm>
+            <a:off x="2340197" y="1030253"/>
+            <a:ext cx="2900051" cy="637132"/>
+          </a:xfrm>
+          <a:prstGeom prst="rect">
+            <a:avLst/>
+          </a:prstGeom>
+        </p:spPr>
+      </p:pic>
+      <p:pic>
+        <p:nvPicPr>
+          <p:cNvPr id="7" name="Image 6">
+            <a:extLst>
+              <a:ext uri="{FF2B5EF4-FFF2-40B4-BE49-F238E27FC236}">
+                <a16:creationId xmlns:a16="http://schemas.microsoft.com/office/drawing/2014/main" id="{29F15C7D-02FC-47C7-AD0D-2904E1B011C0}"/>
+              </a:ext>
+            </a:extLst>
+          </p:cNvPr>
+          <p:cNvPicPr>
+            <a:picLocks noChangeAspect="1"/>
+          </p:cNvPicPr>
+          <p:nvPr/>
+        </p:nvPicPr>
+        <p:blipFill>
+          <a:blip r:embed="rId5"/>
+          <a:stretch>
+            <a:fillRect/>
+          </a:stretch>
+        </p:blipFill>
+        <p:spPr>
+          <a:xfrm>
+            <a:off x="1392332" y="1953077"/>
+            <a:ext cx="4223093" cy="2296682"/>
+          </a:xfrm>
+          <a:prstGeom prst="rect">
+            <a:avLst/>
+          </a:prstGeom>
+        </p:spPr>
+      </p:pic>
     </p:spTree>
     <p:extLst>
       <p:ext uri="{BB962C8B-B14F-4D97-AF65-F5344CB8AC3E}">
-        <p14:creationId xmlns:p14="http://schemas.microsoft.com/office/powerpoint/2010/main" val="524656488"/>
+        <p14:creationId xmlns:p14="http://schemas.microsoft.com/office/powerpoint/2010/main" val="162992510"/>
+      </p:ext>
+    </p:extLst>
+  </p:cSld>
+  <p:clrMapOvr>
+    <a:masterClrMapping/>
+  </p:clrMapOvr>
+</p:sld>
+</file>
+
+<file path=ppt/slides/slide7.xml><?xml version="1.0" encoding="utf-8"?>
+<p:sld xmlns:a="http://schemas.openxmlformats.org/drawingml/2006/main" xmlns:r="http://schemas.openxmlformats.org/officeDocument/2006/relationships" xmlns:p="http://schemas.openxmlformats.org/presentationml/2006/main">
+  <p:cSld>
+    <p:spTree>
+      <p:nvGrpSpPr>
+        <p:cNvPr id="1" name=""/>
+        <p:cNvGrpSpPr/>
+        <p:nvPr/>
+      </p:nvGrpSpPr>
+      <p:grpSpPr>
+        <a:xfrm>
+          <a:off x="0" y="0"/>
+          <a:ext cx="0" cy="0"/>
+          <a:chOff x="0" y="0"/>
+          <a:chExt cx="0" cy="0"/>
+        </a:xfrm>
+      </p:grpSpPr>
+      <p:sp>
+        <p:nvSpPr>
+          <p:cNvPr id="2" name="Titre 1">
+            <a:extLst>
+              <a:ext uri="{FF2B5EF4-FFF2-40B4-BE49-F238E27FC236}">
+                <a16:creationId xmlns:a16="http://schemas.microsoft.com/office/drawing/2014/main" id="{2C3965A7-B604-4E64-9D4C-070264B2D224}"/>
+              </a:ext>
+            </a:extLst>
+          </p:cNvPr>
+          <p:cNvSpPr>
+            <a:spLocks noGrp="1"/>
+          </p:cNvSpPr>
+          <p:nvPr>
+            <p:ph type="title"/>
+          </p:nvPr>
+        </p:nvSpPr>
+        <p:spPr>
+          <a:xfrm>
+            <a:off x="1484310" y="190500"/>
+            <a:ext cx="10018713" cy="1752599"/>
+          </a:xfrm>
+        </p:spPr>
+        <p:txBody>
+          <a:bodyPr/>
+          <a:lstStyle/>
+          <a:p>
+            <a:r>
+              <a:rPr lang="fr-FR" sz="6000" b="1" dirty="0">
+                <a:solidFill>
+                  <a:schemeClr val="bg1"/>
+                </a:solidFill>
+              </a:rPr>
+              <a:t>Conclusion</a:t>
+            </a:r>
+            <a:endParaRPr lang="fr-FR" b="1" dirty="0">
+              <a:solidFill>
+                <a:schemeClr val="bg1"/>
+              </a:solidFill>
+            </a:endParaRPr>
+          </a:p>
+        </p:txBody>
+      </p:sp>
+      <p:sp>
+        <p:nvSpPr>
+          <p:cNvPr id="3" name="Espace réservé du contenu 2">
+            <a:extLst>
+              <a:ext uri="{FF2B5EF4-FFF2-40B4-BE49-F238E27FC236}">
+                <a16:creationId xmlns:a16="http://schemas.microsoft.com/office/drawing/2014/main" id="{3C1CEEDE-0D43-49D9-A87F-80F8BF1A3267}"/>
+              </a:ext>
+            </a:extLst>
+          </p:cNvPr>
+          <p:cNvSpPr>
+            <a:spLocks noGrp="1"/>
+          </p:cNvSpPr>
+          <p:nvPr>
+            <p:ph idx="1"/>
+          </p:nvPr>
+        </p:nvSpPr>
+        <p:spPr>
+          <a:xfrm>
+            <a:off x="1595405" y="2148198"/>
+            <a:ext cx="10018713" cy="3124201"/>
+          </a:xfrm>
+        </p:spPr>
+        <p:txBody>
+          <a:bodyPr/>
+          <a:lstStyle/>
+          <a:p>
+            <a:r>
+              <a:rPr lang="fr-FR" dirty="0"/>
+              <a:t>Liberty expression</a:t>
+            </a:r>
+          </a:p>
+          <a:p>
+            <a:r>
+              <a:rPr lang="fr-FR" dirty="0" err="1"/>
+              <a:t>Illegal</a:t>
+            </a:r>
+            <a:r>
+              <a:rPr lang="fr-FR" dirty="0"/>
+              <a:t> </a:t>
+            </a:r>
+            <a:r>
+              <a:rPr lang="fr-FR" dirty="0" err="1"/>
+              <a:t>products</a:t>
+            </a:r>
+            <a:endParaRPr lang="fr-FR" dirty="0"/>
+          </a:p>
+          <a:p>
+            <a:endParaRPr lang="fr-FR" dirty="0"/>
+          </a:p>
+          <a:p>
+            <a:endParaRPr lang="fr-FR" dirty="0"/>
+          </a:p>
+          <a:p>
+            <a:endParaRPr lang="fr-FR" dirty="0"/>
+          </a:p>
+          <a:p>
+            <a:r>
+              <a:rPr lang="fr-FR" dirty="0" err="1"/>
+              <a:t>My</a:t>
+            </a:r>
+            <a:r>
+              <a:rPr lang="fr-FR" dirty="0"/>
+              <a:t> </a:t>
+            </a:r>
+            <a:r>
+              <a:rPr lang="fr-FR" dirty="0" err="1"/>
+              <a:t>experience</a:t>
+            </a:r>
+            <a:r>
+              <a:rPr lang="fr-FR" dirty="0"/>
+              <a:t> and opinion</a:t>
+            </a:r>
+          </a:p>
+        </p:txBody>
+      </p:sp>
+      <p:pic>
+        <p:nvPicPr>
+          <p:cNvPr id="4" name="Image 3">
+            <a:extLst>
+              <a:ext uri="{FF2B5EF4-FFF2-40B4-BE49-F238E27FC236}">
+                <a16:creationId xmlns:a16="http://schemas.microsoft.com/office/drawing/2014/main" id="{7543689D-FAB8-4B5B-AA6F-14793C3F0B9F}"/>
+              </a:ext>
+            </a:extLst>
+          </p:cNvPr>
+          <p:cNvPicPr>
+            <a:picLocks noChangeAspect="1"/>
+          </p:cNvPicPr>
+          <p:nvPr/>
+        </p:nvPicPr>
+        <p:blipFill>
+          <a:blip r:embed="rId2"/>
+          <a:stretch>
+            <a:fillRect/>
+          </a:stretch>
+        </p:blipFill>
+        <p:spPr>
+          <a:xfrm>
+            <a:off x="5611653" y="1943099"/>
+            <a:ext cx="6002465" cy="4094237"/>
+          </a:xfrm>
+          <a:prstGeom prst="rect">
+            <a:avLst/>
+          </a:prstGeom>
+        </p:spPr>
+      </p:pic>
+    </p:spTree>
+    <p:extLst>
+      <p:ext uri="{BB962C8B-B14F-4D97-AF65-F5344CB8AC3E}">
+        <p14:creationId xmlns:p14="http://schemas.microsoft.com/office/powerpoint/2010/main" val="837620746"/>
       </p:ext>
     </p:extLst>
   </p:cSld>

</xml_diff>